<commit_message>
Correção do slide da Aula05
</commit_message>
<xml_diff>
--- a/Aula05-Navegação entre Telas/Aula05-Navegação entre Telas.pptx
+++ b/Aula05-Navegação entre Telas/Aula05-Navegação entre Telas.pptx
@@ -11,37 +11,39 @@
     <p:sldId id="276" r:id="rId5"/>
     <p:sldId id="277" r:id="rId6"/>
     <p:sldId id="278" r:id="rId7"/>
-    <p:sldId id="279" r:id="rId8"/>
-    <p:sldId id="281" r:id="rId9"/>
-    <p:sldId id="282" r:id="rId10"/>
-    <p:sldId id="283" r:id="rId11"/>
-    <p:sldId id="280" r:id="rId12"/>
+    <p:sldId id="284" r:id="rId8"/>
+    <p:sldId id="279" r:id="rId9"/>
+    <p:sldId id="281" r:id="rId10"/>
+    <p:sldId id="282" r:id="rId11"/>
+    <p:sldId id="283" r:id="rId12"/>
+    <p:sldId id="285" r:id="rId13"/>
+    <p:sldId id="280" r:id="rId14"/>
   </p:sldIdLst>
   <p:sldSz cx="18288000" cy="10287000"/>
   <p:notesSz cx="6858000" cy="9144000"/>
   <p:embeddedFontLst>
     <p:embeddedFont>
-      <p:font typeface="Calibri" panose="020F0502020204030204" pitchFamily="34" charset="0"/>
-      <p:regular r:id="rId13"/>
-      <p:bold r:id="rId14"/>
-      <p:italic r:id="rId15"/>
-      <p:boldItalic r:id="rId16"/>
+      <p:font typeface="Poppins Ultra-Bold" panose="020B0604020202020204" charset="0"/>
+      <p:regular r:id="rId15"/>
+    </p:embeddedFont>
+    <p:embeddedFont>
+      <p:font typeface="Lato Bold" panose="020B0604020202020204" charset="0"/>
+      <p:regular r:id="rId16"/>
     </p:embeddedFont>
     <p:embeddedFont>
       <p:font typeface="Poppins Bold" panose="020B0604020202020204" charset="0"/>
       <p:regular r:id="rId17"/>
     </p:embeddedFont>
     <p:embeddedFont>
-      <p:font typeface="Poppins Ultra-Bold" panose="020B0604020202020204" charset="0"/>
+      <p:font typeface="Lato" panose="020B0604020202020204" charset="0"/>
       <p:regular r:id="rId18"/>
     </p:embeddedFont>
     <p:embeddedFont>
-      <p:font typeface="Lato" panose="020B0604020202020204" charset="0"/>
+      <p:font typeface="Calibri" panose="020F0502020204030204" pitchFamily="34" charset="0"/>
       <p:regular r:id="rId19"/>
-    </p:embeddedFont>
-    <p:embeddedFont>
-      <p:font typeface="Lato Bold" panose="020B0604020202020204" charset="0"/>
-      <p:regular r:id="rId20"/>
+      <p:bold r:id="rId20"/>
+      <p:italic r:id="rId21"/>
+      <p:boldItalic r:id="rId22"/>
     </p:embeddedFont>
   </p:embeddedFontLst>
   <p:defaultTextStyle>
@@ -338,7 +340,7 @@
             <a:fld id="{1D8BD707-D9CF-40AE-B4C6-C98DA3205C09}" type="datetimeFigureOut">
               <a:rPr lang="en-US" smtClean="0"/>
               <a:pPr/>
-              <a:t>3/6/2024</a:t>
+              <a:t>3/8/2024</a:t>
             </a:fld>
             <a:endParaRPr lang="en-US"/>
           </a:p>
@@ -503,7 +505,7 @@
             <a:fld id="{1D8BD707-D9CF-40AE-B4C6-C98DA3205C09}" type="datetimeFigureOut">
               <a:rPr lang="en-US" smtClean="0"/>
               <a:pPr/>
-              <a:t>3/6/2024</a:t>
+              <a:t>3/8/2024</a:t>
             </a:fld>
             <a:endParaRPr lang="en-US"/>
           </a:p>
@@ -678,7 +680,7 @@
             <a:fld id="{1D8BD707-D9CF-40AE-B4C6-C98DA3205C09}" type="datetimeFigureOut">
               <a:rPr lang="en-US" smtClean="0"/>
               <a:pPr/>
-              <a:t>3/6/2024</a:t>
+              <a:t>3/8/2024</a:t>
             </a:fld>
             <a:endParaRPr lang="en-US"/>
           </a:p>
@@ -843,7 +845,7 @@
             <a:fld id="{1D8BD707-D9CF-40AE-B4C6-C98DA3205C09}" type="datetimeFigureOut">
               <a:rPr lang="en-US" smtClean="0"/>
               <a:pPr/>
-              <a:t>3/6/2024</a:t>
+              <a:t>3/8/2024</a:t>
             </a:fld>
             <a:endParaRPr lang="en-US"/>
           </a:p>
@@ -1085,7 +1087,7 @@
             <a:fld id="{1D8BD707-D9CF-40AE-B4C6-C98DA3205C09}" type="datetimeFigureOut">
               <a:rPr lang="en-US" smtClean="0"/>
               <a:pPr/>
-              <a:t>3/6/2024</a:t>
+              <a:t>3/8/2024</a:t>
             </a:fld>
             <a:endParaRPr lang="en-US"/>
           </a:p>
@@ -1367,7 +1369,7 @@
             <a:fld id="{1D8BD707-D9CF-40AE-B4C6-C98DA3205C09}" type="datetimeFigureOut">
               <a:rPr lang="en-US" smtClean="0"/>
               <a:pPr/>
-              <a:t>3/6/2024</a:t>
+              <a:t>3/8/2024</a:t>
             </a:fld>
             <a:endParaRPr lang="en-US"/>
           </a:p>
@@ -1783,7 +1785,7 @@
             <a:fld id="{1D8BD707-D9CF-40AE-B4C6-C98DA3205C09}" type="datetimeFigureOut">
               <a:rPr lang="en-US" smtClean="0"/>
               <a:pPr/>
-              <a:t>3/6/2024</a:t>
+              <a:t>3/8/2024</a:t>
             </a:fld>
             <a:endParaRPr lang="en-US"/>
           </a:p>
@@ -1897,7 +1899,7 @@
             <a:fld id="{1D8BD707-D9CF-40AE-B4C6-C98DA3205C09}" type="datetimeFigureOut">
               <a:rPr lang="en-US" smtClean="0"/>
               <a:pPr/>
-              <a:t>3/6/2024</a:t>
+              <a:t>3/8/2024</a:t>
             </a:fld>
             <a:endParaRPr lang="en-US"/>
           </a:p>
@@ -1989,7 +1991,7 @@
             <a:fld id="{1D8BD707-D9CF-40AE-B4C6-C98DA3205C09}" type="datetimeFigureOut">
               <a:rPr lang="en-US" smtClean="0"/>
               <a:pPr/>
-              <a:t>3/6/2024</a:t>
+              <a:t>3/8/2024</a:t>
             </a:fld>
             <a:endParaRPr lang="en-US"/>
           </a:p>
@@ -2261,7 +2263,7 @@
             <a:fld id="{1D8BD707-D9CF-40AE-B4C6-C98DA3205C09}" type="datetimeFigureOut">
               <a:rPr lang="en-US" smtClean="0"/>
               <a:pPr/>
-              <a:t>3/6/2024</a:t>
+              <a:t>3/8/2024</a:t>
             </a:fld>
             <a:endParaRPr lang="en-US"/>
           </a:p>
@@ -2510,7 +2512,7 @@
             <a:fld id="{1D8BD707-D9CF-40AE-B4C6-C98DA3205C09}" type="datetimeFigureOut">
               <a:rPr lang="en-US" smtClean="0"/>
               <a:pPr/>
-              <a:t>3/6/2024</a:t>
+              <a:t>3/8/2024</a:t>
             </a:fld>
             <a:endParaRPr lang="en-US"/>
           </a:p>
@@ -2718,7 +2720,7 @@
             <a:fld id="{1D8BD707-D9CF-40AE-B4C6-C98DA3205C09}" type="datetimeFigureOut">
               <a:rPr lang="en-US" smtClean="0"/>
               <a:pPr/>
-              <a:t>3/6/2024</a:t>
+              <a:t>3/8/2024</a:t>
             </a:fld>
             <a:endParaRPr lang="en-US"/>
           </a:p>
@@ -3522,7 +3524,7 @@
               <a:alphaModFix amt="69000"/>
               <a:extLst>
                 <a:ext uri="{96DAC541-7B7A-43D3-8B79-37D633B846F1}">
-                  <asvg:svgBlip xmlns="" xmlns:asvg="http://schemas.microsoft.com/office/drawing/2016/SVG/main" r:embed="rId3"/>
+                  <asvg:svgBlip xmlns:asvg="http://schemas.microsoft.com/office/drawing/2016/SVG/main" xmlns="" r:embed="rId3"/>
                 </a:ext>
               </a:extLst>
             </a:blip>
@@ -3682,6 +3684,304 @@
         </p:nvSpPr>
         <p:spPr>
           <a:xfrm>
+            <a:off x="228600" y="2081014"/>
+            <a:ext cx="7945120" cy="6155531"/>
+          </a:xfrm>
+          <a:prstGeom prst="rect">
+            <a:avLst/>
+          </a:prstGeom>
+        </p:spPr>
+        <p:txBody>
+          <a:bodyPr wrap="square" lIns="0" tIns="0" rIns="0" bIns="0" rtlCol="0" anchor="t">
+            <a:spAutoFit/>
+          </a:bodyPr>
+          <a:lstStyle/>
+          <a:p>
+            <a:pPr marL="457200" indent="-457200" algn="just">
+              <a:lnSpc>
+                <a:spcPts val="4759"/>
+              </a:lnSpc>
+              <a:buFont typeface="Arial" panose="020B0604020202020204" pitchFamily="34" charset="0"/>
+              <a:buChar char="•"/>
+            </a:pPr>
+            <a:r>
+              <a:rPr lang="pt-BR" sz="3400" spc="339" dirty="0" smtClean="0">
+                <a:solidFill>
+                  <a:srgbClr val="000000"/>
+                </a:solidFill>
+                <a:latin typeface="Lato" panose="020B0604020202020204" charset="0"/>
+                <a:ea typeface="Lato" panose="020B0604020202020204" charset="0"/>
+                <a:cs typeface="Lato" panose="020B0604020202020204" charset="0"/>
+              </a:rPr>
+              <a:t>Serão criadas duas telas;</a:t>
+            </a:r>
+          </a:p>
+          <a:p>
+            <a:pPr marL="457200" indent="-457200" algn="just">
+              <a:lnSpc>
+                <a:spcPts val="4759"/>
+              </a:lnSpc>
+              <a:buFont typeface="Arial" panose="020B0604020202020204" pitchFamily="34" charset="0"/>
+              <a:buChar char="•"/>
+            </a:pPr>
+            <a:endParaRPr lang="pt-BR" sz="3400" spc="339" dirty="0">
+              <a:solidFill>
+                <a:srgbClr val="000000"/>
+              </a:solidFill>
+              <a:latin typeface="Lato" panose="020B0604020202020204" charset="0"/>
+              <a:ea typeface="Lato" panose="020B0604020202020204" charset="0"/>
+              <a:cs typeface="Lato" panose="020B0604020202020204" charset="0"/>
+            </a:endParaRPr>
+          </a:p>
+          <a:p>
+            <a:pPr marL="457200" indent="-457200" algn="just">
+              <a:lnSpc>
+                <a:spcPts val="4759"/>
+              </a:lnSpc>
+              <a:buFont typeface="Arial" panose="020B0604020202020204" pitchFamily="34" charset="0"/>
+              <a:buChar char="•"/>
+            </a:pPr>
+            <a:r>
+              <a:rPr lang="pt-BR" sz="3400" spc="339" dirty="0" smtClean="0">
+                <a:solidFill>
+                  <a:srgbClr val="000000"/>
+                </a:solidFill>
+                <a:latin typeface="Lato" panose="020B0604020202020204" charset="0"/>
+                <a:ea typeface="Lato" panose="020B0604020202020204" charset="0"/>
+                <a:cs typeface="Lato" panose="020B0604020202020204" charset="0"/>
+              </a:rPr>
+              <a:t>A primeira tela contém um botão que navega para a segunda tela;</a:t>
+            </a:r>
+          </a:p>
+          <a:p>
+            <a:pPr marL="457200" indent="-457200" algn="just">
+              <a:lnSpc>
+                <a:spcPts val="4759"/>
+              </a:lnSpc>
+              <a:buFont typeface="Arial" panose="020B0604020202020204" pitchFamily="34" charset="0"/>
+              <a:buChar char="•"/>
+            </a:pPr>
+            <a:endParaRPr lang="pt-BR" sz="3400" spc="339" dirty="0">
+              <a:solidFill>
+                <a:srgbClr val="000000"/>
+              </a:solidFill>
+              <a:latin typeface="Lato" panose="020B0604020202020204" charset="0"/>
+              <a:ea typeface="Lato" panose="020B0604020202020204" charset="0"/>
+              <a:cs typeface="Lato" panose="020B0604020202020204" charset="0"/>
+            </a:endParaRPr>
+          </a:p>
+          <a:p>
+            <a:pPr marL="457200" indent="-457200">
+              <a:lnSpc>
+                <a:spcPts val="4759"/>
+              </a:lnSpc>
+              <a:buFont typeface="Arial" panose="020B0604020202020204" pitchFamily="34" charset="0"/>
+              <a:buChar char="•"/>
+            </a:pPr>
+            <a:r>
+              <a:rPr lang="pt-BR" sz="3400" spc="339" dirty="0" smtClean="0">
+                <a:solidFill>
+                  <a:srgbClr val="000000"/>
+                </a:solidFill>
+                <a:latin typeface="Lato" panose="020B0604020202020204" charset="0"/>
+                <a:ea typeface="Lato" panose="020B0604020202020204" charset="0"/>
+                <a:cs typeface="Lato" panose="020B0604020202020204" charset="0"/>
+              </a:rPr>
+              <a:t>A função “</a:t>
+            </a:r>
+            <a:r>
+              <a:rPr lang="pt-BR" sz="3400" spc="339" dirty="0" err="1" smtClean="0">
+                <a:solidFill>
+                  <a:srgbClr val="000000"/>
+                </a:solidFill>
+                <a:latin typeface="Lato" panose="020B0604020202020204" charset="0"/>
+                <a:ea typeface="Lato" panose="020B0604020202020204" charset="0"/>
+                <a:cs typeface="Lato" panose="020B0604020202020204" charset="0"/>
+              </a:rPr>
+              <a:t>Navigator.pushNamed</a:t>
+            </a:r>
+            <a:r>
+              <a:rPr lang="pt-BR" sz="3400" spc="339" dirty="0" smtClean="0">
+                <a:solidFill>
+                  <a:srgbClr val="000000"/>
+                </a:solidFill>
+                <a:latin typeface="Lato" panose="020B0604020202020204" charset="0"/>
+                <a:ea typeface="Lato" panose="020B0604020202020204" charset="0"/>
+                <a:cs typeface="Lato" panose="020B0604020202020204" charset="0"/>
+              </a:rPr>
+              <a:t>” aciona a navegação, indicando qual será o caminho.</a:t>
+            </a:r>
+          </a:p>
+        </p:txBody>
+      </p:sp>
+      <p:sp>
+        <p:nvSpPr>
+          <p:cNvPr id="4" name="CaixaDeTexto 3"/>
+          <p:cNvSpPr txBox="1"/>
+          <p:nvPr/>
+        </p:nvSpPr>
+        <p:spPr>
+          <a:xfrm>
+            <a:off x="11322551" y="7998018"/>
+            <a:ext cx="3708066" cy="477054"/>
+          </a:xfrm>
+          <a:prstGeom prst="rect">
+            <a:avLst/>
+          </a:prstGeom>
+          <a:noFill/>
+        </p:spPr>
+        <p:txBody>
+          <a:bodyPr wrap="none" rtlCol="0">
+            <a:spAutoFit/>
+          </a:bodyPr>
+          <a:lstStyle/>
+          <a:p>
+            <a:r>
+              <a:rPr lang="pt-BR" sz="2500" dirty="0" smtClean="0">
+                <a:latin typeface="Lato" panose="020B0604020202020204" charset="0"/>
+                <a:ea typeface="Lato" panose="020B0604020202020204" charset="0"/>
+                <a:cs typeface="Lato" panose="020B0604020202020204" charset="0"/>
+              </a:rPr>
+              <a:t>Figura 04 – Primeira Tela</a:t>
+            </a:r>
+            <a:endParaRPr lang="pt-BR" sz="2500" dirty="0">
+              <a:latin typeface="Lato" panose="020B0604020202020204" charset="0"/>
+              <a:ea typeface="Lato" panose="020B0604020202020204" charset="0"/>
+              <a:cs typeface="Lato" panose="020B0604020202020204" charset="0"/>
+            </a:endParaRPr>
+          </a:p>
+        </p:txBody>
+      </p:sp>
+      <p:pic>
+        <p:nvPicPr>
+          <p:cNvPr id="2" name="Imagem 1"/>
+          <p:cNvPicPr>
+            <a:picLocks noChangeAspect="1"/>
+          </p:cNvPicPr>
+          <p:nvPr/>
+        </p:nvPicPr>
+        <p:blipFill>
+          <a:blip r:embed="rId2">
+            <a:extLst>
+              <a:ext uri="{28A0092B-C50C-407E-A947-70E740481C1C}">
+                <a14:useLocalDpi xmlns:a14="http://schemas.microsoft.com/office/drawing/2010/main" val="0"/>
+              </a:ext>
+            </a:extLst>
+          </a:blip>
+          <a:stretch>
+            <a:fillRect/>
+          </a:stretch>
+        </p:blipFill>
+        <p:spPr>
+          <a:xfrm>
+            <a:off x="8382000" y="2628900"/>
+            <a:ext cx="9589169" cy="5059760"/>
+          </a:xfrm>
+          <a:prstGeom prst="rect">
+            <a:avLst/>
+          </a:prstGeom>
+        </p:spPr>
+      </p:pic>
+    </p:spTree>
+    <p:extLst>
+      <p:ext uri="{BB962C8B-B14F-4D97-AF65-F5344CB8AC3E}">
+        <p14:creationId xmlns:p14="http://schemas.microsoft.com/office/powerpoint/2010/main" val="2677243512"/>
+      </p:ext>
+    </p:extLst>
+  </p:cSld>
+  <p:clrMapOvr>
+    <a:masterClrMapping/>
+  </p:clrMapOvr>
+  <p:timing>
+    <p:tnLst>
+      <p:par>
+        <p:cTn id="1" dur="indefinite" restart="never" nodeType="tmRoot"/>
+      </p:par>
+    </p:tnLst>
+  </p:timing>
+</p:sld>
+</file>
+
+<file path=ppt/slides/slide11.xml><?xml version="1.0" encoding="utf-8"?>
+<p:sld xmlns:a="http://schemas.openxmlformats.org/drawingml/2006/main" xmlns:r="http://schemas.openxmlformats.org/officeDocument/2006/relationships" xmlns:p="http://schemas.openxmlformats.org/presentationml/2006/main">
+  <p:cSld>
+    <p:spTree>
+      <p:nvGrpSpPr>
+        <p:cNvPr id="1" name=""/>
+        <p:cNvGrpSpPr/>
+        <p:nvPr/>
+      </p:nvGrpSpPr>
+      <p:grpSpPr>
+        <a:xfrm>
+          <a:off x="0" y="0"/>
+          <a:ext cx="0" cy="0"/>
+          <a:chOff x="0" y="0"/>
+          <a:chExt cx="0" cy="0"/>
+        </a:xfrm>
+      </p:grpSpPr>
+      <p:grpSp>
+        <p:nvGrpSpPr>
+          <p:cNvPr id="14" name="Group 14"/>
+          <p:cNvGrpSpPr/>
+          <p:nvPr/>
+        </p:nvGrpSpPr>
+        <p:grpSpPr>
+          <a:xfrm rot="5400000">
+            <a:off x="-1309" y="1309"/>
+            <a:ext cx="1635964" cy="1633346"/>
+            <a:chOff x="0" y="0"/>
+            <a:chExt cx="6350000" cy="6339840"/>
+          </a:xfrm>
+        </p:grpSpPr>
+        <p:sp>
+          <p:nvSpPr>
+            <p:cNvPr id="15" name="Freeform 15"/>
+            <p:cNvSpPr/>
+            <p:nvPr/>
+          </p:nvSpPr>
+          <p:spPr>
+            <a:xfrm>
+              <a:off x="0" y="0"/>
+              <a:ext cx="6350000" cy="6339840"/>
+            </a:xfrm>
+            <a:custGeom>
+              <a:avLst/>
+              <a:gdLst/>
+              <a:ahLst/>
+              <a:cxnLst/>
+              <a:rect l="l" t="t" r="r" b="b"/>
+              <a:pathLst>
+                <a:path w="6350000" h="6339840">
+                  <a:moveTo>
+                    <a:pt x="6350000" y="6339840"/>
+                  </a:moveTo>
+                  <a:lnTo>
+                    <a:pt x="0" y="6339840"/>
+                  </a:lnTo>
+                  <a:lnTo>
+                    <a:pt x="0" y="0"/>
+                  </a:lnTo>
+                  <a:lnTo>
+                    <a:pt x="6350000" y="6339840"/>
+                  </a:lnTo>
+                  <a:close/>
+                </a:path>
+              </a:pathLst>
+            </a:custGeom>
+            <a:solidFill>
+              <a:srgbClr val="2B4A9D"/>
+            </a:solidFill>
+          </p:spPr>
+        </p:sp>
+      </p:grpSp>
+      <p:sp>
+        <p:nvSpPr>
+          <p:cNvPr id="16" name="TextBox 16"/>
+          <p:cNvSpPr txBox="1"/>
+          <p:nvPr/>
+        </p:nvSpPr>
+        <p:spPr>
+          <a:xfrm>
             <a:off x="228600" y="2851688"/>
             <a:ext cx="8153400" cy="4308872"/>
           </a:xfrm>
@@ -3871,7 +4171,181 @@
 </p:sld>
 </file>
 
-<file path=ppt/slides/slide11.xml><?xml version="1.0" encoding="utf-8"?>
+<file path=ppt/slides/slide12.xml><?xml version="1.0" encoding="utf-8"?>
+<p:sld xmlns:a="http://schemas.openxmlformats.org/drawingml/2006/main" xmlns:r="http://schemas.openxmlformats.org/officeDocument/2006/relationships" xmlns:p="http://schemas.openxmlformats.org/presentationml/2006/main">
+  <p:cSld>
+    <p:spTree>
+      <p:nvGrpSpPr>
+        <p:cNvPr id="1" name=""/>
+        <p:cNvGrpSpPr/>
+        <p:nvPr/>
+      </p:nvGrpSpPr>
+      <p:grpSpPr>
+        <a:xfrm>
+          <a:off x="0" y="0"/>
+          <a:ext cx="0" cy="0"/>
+          <a:chOff x="0" y="0"/>
+          <a:chExt cx="0" cy="0"/>
+        </a:xfrm>
+      </p:grpSpPr>
+      <p:grpSp>
+        <p:nvGrpSpPr>
+          <p:cNvPr id="14" name="Group 14"/>
+          <p:cNvGrpSpPr/>
+          <p:nvPr/>
+        </p:nvGrpSpPr>
+        <p:grpSpPr>
+          <a:xfrm rot="5400000">
+            <a:off x="-1309" y="1309"/>
+            <a:ext cx="1635964" cy="1633346"/>
+            <a:chOff x="0" y="0"/>
+            <a:chExt cx="6350000" cy="6339840"/>
+          </a:xfrm>
+        </p:grpSpPr>
+        <p:sp>
+          <p:nvSpPr>
+            <p:cNvPr id="15" name="Freeform 15"/>
+            <p:cNvSpPr/>
+            <p:nvPr/>
+          </p:nvSpPr>
+          <p:spPr>
+            <a:xfrm>
+              <a:off x="0" y="0"/>
+              <a:ext cx="6350000" cy="6339840"/>
+            </a:xfrm>
+            <a:custGeom>
+              <a:avLst/>
+              <a:gdLst/>
+              <a:ahLst/>
+              <a:cxnLst/>
+              <a:rect l="l" t="t" r="r" b="b"/>
+              <a:pathLst>
+                <a:path w="6350000" h="6339840">
+                  <a:moveTo>
+                    <a:pt x="6350000" y="6339840"/>
+                  </a:moveTo>
+                  <a:lnTo>
+                    <a:pt x="0" y="6339840"/>
+                  </a:lnTo>
+                  <a:lnTo>
+                    <a:pt x="0" y="0"/>
+                  </a:lnTo>
+                  <a:lnTo>
+                    <a:pt x="6350000" y="6339840"/>
+                  </a:lnTo>
+                  <a:close/>
+                </a:path>
+              </a:pathLst>
+            </a:custGeom>
+            <a:solidFill>
+              <a:srgbClr val="2B4A9D"/>
+            </a:solidFill>
+          </p:spPr>
+        </p:sp>
+      </p:grpSp>
+      <p:sp>
+        <p:nvSpPr>
+          <p:cNvPr id="7" name="CaixaDeTexto 6"/>
+          <p:cNvSpPr txBox="1"/>
+          <p:nvPr/>
+        </p:nvSpPr>
+        <p:spPr>
+          <a:xfrm>
+            <a:off x="816673" y="2247900"/>
+            <a:ext cx="16611599" cy="1708160"/>
+          </a:xfrm>
+          <a:prstGeom prst="rect">
+            <a:avLst/>
+          </a:prstGeom>
+          <a:noFill/>
+        </p:spPr>
+        <p:txBody>
+          <a:bodyPr wrap="square" rtlCol="0">
+            <a:spAutoFit/>
+          </a:bodyPr>
+          <a:lstStyle/>
+          <a:p>
+            <a:pPr algn="just"/>
+            <a:r>
+              <a:rPr lang="pt-BR" sz="3500" dirty="0" smtClean="0">
+                <a:latin typeface="Lato" panose="020B0604020202020204" charset="0"/>
+                <a:ea typeface="Lato" panose="020B0604020202020204" charset="0"/>
+                <a:cs typeface="Lato" panose="020B0604020202020204" charset="0"/>
+              </a:rPr>
+              <a:t>O exemplo com o código-fonte utilizando rotas nomeadas está no </a:t>
+            </a:r>
+            <a:r>
+              <a:rPr lang="pt-BR" sz="3500" dirty="0">
+                <a:latin typeface="Lato" panose="020B0604020202020204" charset="0"/>
+                <a:ea typeface="Lato" panose="020B0604020202020204" charset="0"/>
+                <a:cs typeface="Lato" panose="020B0604020202020204" charset="0"/>
+              </a:rPr>
+              <a:t>seguinte link: </a:t>
+            </a:r>
+            <a:r>
+              <a:rPr lang="pt-BR" sz="3500" dirty="0" smtClean="0">
+                <a:latin typeface="Lato" panose="020B0604020202020204" charset="0"/>
+                <a:ea typeface="Lato" panose="020B0604020202020204" charset="0"/>
+                <a:cs typeface="Lato" panose="020B0604020202020204" charset="0"/>
+                <a:hlinkClick r:id="rId2"/>
+              </a:rPr>
+              <a:t>https</a:t>
+            </a:r>
+            <a:r>
+              <a:rPr lang="pt-BR" sz="3500" dirty="0">
+                <a:latin typeface="Lato" panose="020B0604020202020204" charset="0"/>
+                <a:ea typeface="Lato" panose="020B0604020202020204" charset="0"/>
+                <a:cs typeface="Lato" panose="020B0604020202020204" charset="0"/>
+                <a:hlinkClick r:id="rId2"/>
+              </a:rPr>
+              <a:t>://</a:t>
+            </a:r>
+            <a:r>
+              <a:rPr lang="pt-BR" sz="3500" dirty="0" smtClean="0">
+                <a:latin typeface="Lato" panose="020B0604020202020204" charset="0"/>
+                <a:ea typeface="Lato" panose="020B0604020202020204" charset="0"/>
+                <a:cs typeface="Lato" panose="020B0604020202020204" charset="0"/>
+                <a:hlinkClick r:id="rId2"/>
+              </a:rPr>
+              <a:t>github.com/marcosdosea/TreinamentoFlutter/blob/main/Aula05-Navega%C3%A7%C3%A3o%20entre%20Telas/rotasNomeadas.dart</a:t>
+            </a:r>
+            <a:r>
+              <a:rPr lang="pt-BR" sz="3500" dirty="0" smtClean="0">
+                <a:latin typeface="Lato" panose="020B0604020202020204" charset="0"/>
+                <a:ea typeface="Lato" panose="020B0604020202020204" charset="0"/>
+                <a:cs typeface="Lato" panose="020B0604020202020204" charset="0"/>
+              </a:rPr>
+              <a:t>.</a:t>
+            </a:r>
+            <a:endParaRPr lang="pt-BR" sz="3500" dirty="0">
+              <a:latin typeface="Lato" panose="020B0604020202020204" charset="0"/>
+              <a:ea typeface="Lato" panose="020B0604020202020204" charset="0"/>
+              <a:cs typeface="Lato" panose="020B0604020202020204" charset="0"/>
+            </a:endParaRPr>
+          </a:p>
+        </p:txBody>
+      </p:sp>
+    </p:spTree>
+    <p:extLst>
+      <p:ext uri="{BB962C8B-B14F-4D97-AF65-F5344CB8AC3E}">
+        <p14:creationId xmlns:p14="http://schemas.microsoft.com/office/powerpoint/2010/main" val="4289001183"/>
+      </p:ext>
+    </p:extLst>
+  </p:cSld>
+  <p:clrMapOvr>
+    <a:masterClrMapping/>
+  </p:clrMapOvr>
+  <p:timing>
+    <p:tnLst>
+      <p:par>
+        <p:cTn id="1" dur="indefinite" restart="never" nodeType="tmRoot"/>
+      </p:par>
+    </p:tnLst>
+  </p:timing>
+</p:sld>
+</file>
+
+<file path=ppt/slides/slide13.xml><?xml version="1.0" encoding="utf-8"?>
 <p:sld xmlns:a="http://schemas.openxmlformats.org/drawingml/2006/main" xmlns:r="http://schemas.openxmlformats.org/officeDocument/2006/relationships" xmlns:p="http://schemas.openxmlformats.org/presentationml/2006/main">
   <p:cSld>
     <p:spTree>
@@ -7280,95 +7754,6 @@
           <a:chExt cx="0" cy="0"/>
         </a:xfrm>
       </p:grpSpPr>
-      <p:sp>
-        <p:nvSpPr>
-          <p:cNvPr id="13" name="TextBox 13"/>
-          <p:cNvSpPr txBox="1"/>
-          <p:nvPr/>
-        </p:nvSpPr>
-        <p:spPr>
-          <a:xfrm>
-            <a:off x="4800600" y="571500"/>
-            <a:ext cx="8115300" cy="1615827"/>
-          </a:xfrm>
-          <a:prstGeom prst="rect">
-            <a:avLst/>
-          </a:prstGeom>
-        </p:spPr>
-        <p:txBody>
-          <a:bodyPr wrap="square" lIns="0" tIns="0" rIns="0" bIns="0" rtlCol="0" anchor="t">
-            <a:spAutoFit/>
-          </a:bodyPr>
-          <a:lstStyle/>
-          <a:p>
-            <a:pPr algn="ctr">
-              <a:lnSpc>
-                <a:spcPts val="6300"/>
-              </a:lnSpc>
-            </a:pPr>
-            <a:r>
-              <a:rPr lang="en-US" sz="5000" spc="300" dirty="0" smtClean="0">
-                <a:solidFill>
-                  <a:srgbClr val="2B4A9D"/>
-                </a:solidFill>
-                <a:latin typeface="Poppins Ultra-Bold"/>
-              </a:rPr>
-              <a:t>O </a:t>
-            </a:r>
-            <a:r>
-              <a:rPr lang="en-US" sz="5000" spc="300" dirty="0" err="1" smtClean="0">
-                <a:solidFill>
-                  <a:srgbClr val="2B4A9D"/>
-                </a:solidFill>
-                <a:latin typeface="Poppins Ultra-Bold"/>
-              </a:rPr>
-              <a:t>uso</a:t>
-            </a:r>
-            <a:r>
-              <a:rPr lang="en-US" sz="5000" spc="300" dirty="0" smtClean="0">
-                <a:solidFill>
-                  <a:srgbClr val="2B4A9D"/>
-                </a:solidFill>
-                <a:latin typeface="Poppins Ultra-Bold"/>
-              </a:rPr>
-              <a:t> de </a:t>
-            </a:r>
-            <a:r>
-              <a:rPr lang="en-US" sz="5000" spc="300" dirty="0" err="1" smtClean="0">
-                <a:solidFill>
-                  <a:srgbClr val="2B4A9D"/>
-                </a:solidFill>
-                <a:latin typeface="Poppins Ultra-Bold"/>
-              </a:rPr>
-              <a:t>Rotas</a:t>
-            </a:r>
-            <a:r>
-              <a:rPr lang="en-US" sz="5000" spc="300" dirty="0" smtClean="0">
-                <a:solidFill>
-                  <a:srgbClr val="2B4A9D"/>
-                </a:solidFill>
-                <a:latin typeface="Poppins Ultra-Bold"/>
-              </a:rPr>
-              <a:t> </a:t>
-            </a:r>
-            <a:r>
-              <a:rPr lang="en-US" sz="5000" spc="300" dirty="0" err="1" smtClean="0">
-                <a:solidFill>
-                  <a:srgbClr val="2B4A9D"/>
-                </a:solidFill>
-                <a:latin typeface="Poppins Ultra-Bold"/>
-              </a:rPr>
-              <a:t>Nomeadas</a:t>
-            </a:r>
-            <a:endParaRPr lang="en-US" sz="5000" spc="300" dirty="0">
-              <a:solidFill>
-                <a:srgbClr val="2B4A9D"/>
-              </a:solidFill>
-              <a:latin typeface="Poppins Ultra-Bold"/>
-            </a:endParaRPr>
-          </a:p>
-        </p:txBody>
-      </p:sp>
       <p:grpSp>
         <p:nvGrpSpPr>
           <p:cNvPr id="14" name="Group 14"/>
@@ -7426,205 +7811,106 @@
       </p:grpSp>
       <p:sp>
         <p:nvSpPr>
-          <p:cNvPr id="16" name="TextBox 16"/>
+          <p:cNvPr id="2" name="CaixaDeTexto 1"/>
           <p:cNvSpPr txBox="1"/>
           <p:nvPr/>
         </p:nvSpPr>
         <p:spPr>
           <a:xfrm>
-            <a:off x="990600" y="2933700"/>
-            <a:ext cx="16144008" cy="6155531"/>
+            <a:off x="1143000" y="2247900"/>
+            <a:ext cx="16611599" cy="1708160"/>
           </a:xfrm>
           <a:prstGeom prst="rect">
             <a:avLst/>
           </a:prstGeom>
+          <a:noFill/>
         </p:spPr>
         <p:txBody>
-          <a:bodyPr wrap="square" lIns="0" tIns="0" rIns="0" bIns="0" rtlCol="0" anchor="t">
+          <a:bodyPr wrap="square" rtlCol="0">
             <a:spAutoFit/>
           </a:bodyPr>
           <a:lstStyle/>
           <a:p>
-            <a:pPr marL="457200" indent="-457200" algn="just">
-              <a:lnSpc>
-                <a:spcPts val="4759"/>
-              </a:lnSpc>
-              <a:buFont typeface="Arial" panose="020B0604020202020204" pitchFamily="34" charset="0"/>
-              <a:buChar char="•"/>
-            </a:pPr>
-            <a:r>
-              <a:rPr lang="pt-BR" sz="3400" spc="339" dirty="0" smtClean="0">
-                <a:solidFill>
-                  <a:srgbClr val="000000"/>
-                </a:solidFill>
-                <a:latin typeface="Lato" panose="020B0604020202020204" charset="0"/>
-                <a:ea typeface="Lato" panose="020B0604020202020204" charset="0"/>
-                <a:cs typeface="Lato" panose="020B0604020202020204" charset="0"/>
-              </a:rPr>
-              <a:t>No roteamento nomeado, é definido uma tabela de rotas, com os nomes de rotas e seus respectivos </a:t>
-            </a:r>
-            <a:r>
-              <a:rPr lang="pt-BR" sz="3400" spc="339" dirty="0" err="1" smtClean="0">
-                <a:solidFill>
-                  <a:srgbClr val="000000"/>
-                </a:solidFill>
-                <a:latin typeface="Lato" panose="020B0604020202020204" charset="0"/>
-                <a:ea typeface="Lato" panose="020B0604020202020204" charset="0"/>
-                <a:cs typeface="Lato" panose="020B0604020202020204" charset="0"/>
-              </a:rPr>
-              <a:t>widgets</a:t>
-            </a:r>
-            <a:r>
-              <a:rPr lang="pt-BR" sz="3400" spc="339" dirty="0" smtClean="0">
-                <a:solidFill>
-                  <a:srgbClr val="000000"/>
-                </a:solidFill>
-                <a:latin typeface="Lato" panose="020B0604020202020204" charset="0"/>
-                <a:ea typeface="Lato" panose="020B0604020202020204" charset="0"/>
-                <a:cs typeface="Lato" panose="020B0604020202020204" charset="0"/>
-              </a:rPr>
-              <a:t>;</a:t>
-            </a:r>
-          </a:p>
-          <a:p>
-            <a:pPr marL="457200" indent="-457200" algn="just">
-              <a:lnSpc>
-                <a:spcPts val="4759"/>
-              </a:lnSpc>
-              <a:buFont typeface="Arial" panose="020B0604020202020204" pitchFamily="34" charset="0"/>
-              <a:buChar char="•"/>
-            </a:pPr>
-            <a:endParaRPr lang="pt-BR" sz="3400" spc="339" dirty="0">
-              <a:solidFill>
-                <a:srgbClr val="000000"/>
-              </a:solidFill>
+            <a:pPr algn="just"/>
+            <a:r>
+              <a:rPr lang="pt-BR" sz="3500" dirty="0" smtClean="0">
+                <a:latin typeface="Lato" panose="020B0604020202020204" charset="0"/>
+                <a:ea typeface="Lato" panose="020B0604020202020204" charset="0"/>
+                <a:cs typeface="Lato" panose="020B0604020202020204" charset="0"/>
+              </a:rPr>
+              <a:t>O exemplo com o código-fonte utilizando o </a:t>
+            </a:r>
+            <a:r>
+              <a:rPr lang="pt-BR" sz="3500" dirty="0" err="1" smtClean="0">
+                <a:latin typeface="Lato" panose="020B0604020202020204" charset="0"/>
+                <a:ea typeface="Lato" panose="020B0604020202020204" charset="0"/>
+                <a:cs typeface="Lato" panose="020B0604020202020204" charset="0"/>
+              </a:rPr>
+              <a:t>navigator</a:t>
+            </a:r>
+            <a:r>
+              <a:rPr lang="pt-BR" sz="3500" dirty="0" smtClean="0">
+                <a:latin typeface="Lato" panose="020B0604020202020204" charset="0"/>
+                <a:ea typeface="Lato" panose="020B0604020202020204" charset="0"/>
+                <a:cs typeface="Lato" panose="020B0604020202020204" charset="0"/>
+              </a:rPr>
+              <a:t> básico está no </a:t>
+            </a:r>
+            <a:r>
+              <a:rPr lang="pt-BR" sz="3500" dirty="0">
+                <a:latin typeface="Lato" panose="020B0604020202020204" charset="0"/>
+                <a:ea typeface="Lato" panose="020B0604020202020204" charset="0"/>
+                <a:cs typeface="Lato" panose="020B0604020202020204" charset="0"/>
+              </a:rPr>
+              <a:t>seguinte link: </a:t>
+            </a:r>
+            <a:r>
+              <a:rPr lang="pt-BR" sz="3500" dirty="0" smtClean="0">
+                <a:latin typeface="Lato" panose="020B0604020202020204" charset="0"/>
+                <a:ea typeface="Lato" panose="020B0604020202020204" charset="0"/>
+                <a:cs typeface="Lato" panose="020B0604020202020204" charset="0"/>
+                <a:hlinkClick r:id="rId2"/>
+              </a:rPr>
+              <a:t>https</a:t>
+            </a:r>
+            <a:r>
+              <a:rPr lang="pt-BR" sz="3500" dirty="0">
+                <a:latin typeface="Lato" panose="020B0604020202020204" charset="0"/>
+                <a:ea typeface="Lato" panose="020B0604020202020204" charset="0"/>
+                <a:cs typeface="Lato" panose="020B0604020202020204" charset="0"/>
+                <a:hlinkClick r:id="rId2"/>
+              </a:rPr>
+              <a:t>://</a:t>
+            </a:r>
+            <a:r>
+              <a:rPr lang="pt-BR" sz="3500" dirty="0" smtClean="0">
+                <a:latin typeface="Lato" panose="020B0604020202020204" charset="0"/>
+                <a:ea typeface="Lato" panose="020B0604020202020204" charset="0"/>
+                <a:cs typeface="Lato" panose="020B0604020202020204" charset="0"/>
+                <a:hlinkClick r:id="rId2"/>
+              </a:rPr>
+              <a:t>github.com/marcosdosea/TreinamentoFlutter/blob/main/Aula05-Navega%C3%A7%C3%A3o%20entre%20Telas/navigatorBasico.dart</a:t>
+            </a:r>
+            <a:r>
+              <a:rPr lang="pt-BR" sz="3500" dirty="0" smtClean="0">
+                <a:latin typeface="Lato" panose="020B0604020202020204" charset="0"/>
+                <a:ea typeface="Lato" panose="020B0604020202020204" charset="0"/>
+                <a:cs typeface="Lato" panose="020B0604020202020204" charset="0"/>
+              </a:rPr>
+              <a:t>.</a:t>
+            </a:r>
+            <a:endParaRPr lang="pt-BR" sz="3500" dirty="0">
               <a:latin typeface="Lato" panose="020B0604020202020204" charset="0"/>
               <a:ea typeface="Lato" panose="020B0604020202020204" charset="0"/>
               <a:cs typeface="Lato" panose="020B0604020202020204" charset="0"/>
             </a:endParaRPr>
           </a:p>
-          <a:p>
-            <a:pPr marL="457200" indent="-457200" algn="just">
-              <a:lnSpc>
-                <a:spcPts val="4759"/>
-              </a:lnSpc>
-              <a:buFont typeface="Arial" panose="020B0604020202020204" pitchFamily="34" charset="0"/>
-              <a:buChar char="•"/>
-            </a:pPr>
-            <a:r>
-              <a:rPr lang="pt-BR" sz="3400" spc="339" dirty="0" smtClean="0">
-                <a:solidFill>
-                  <a:srgbClr val="000000"/>
-                </a:solidFill>
-                <a:latin typeface="Lato" panose="020B0604020202020204" charset="0"/>
-                <a:ea typeface="Lato" panose="020B0604020202020204" charset="0"/>
-                <a:cs typeface="Lato" panose="020B0604020202020204" charset="0"/>
-              </a:rPr>
-              <a:t>Então, é possível navegar para um </a:t>
-            </a:r>
-            <a:r>
-              <a:rPr lang="pt-BR" sz="3400" spc="339" dirty="0" err="1" smtClean="0">
-                <a:solidFill>
-                  <a:srgbClr val="000000"/>
-                </a:solidFill>
-                <a:latin typeface="Lato" panose="020B0604020202020204" charset="0"/>
-                <a:ea typeface="Lato" panose="020B0604020202020204" charset="0"/>
-                <a:cs typeface="Lato" panose="020B0604020202020204" charset="0"/>
-              </a:rPr>
-              <a:t>widget</a:t>
-            </a:r>
-            <a:r>
-              <a:rPr lang="pt-BR" sz="3400" spc="339" dirty="0" smtClean="0">
-                <a:solidFill>
-                  <a:srgbClr val="000000"/>
-                </a:solidFill>
-                <a:latin typeface="Lato" panose="020B0604020202020204" charset="0"/>
-                <a:ea typeface="Lato" panose="020B0604020202020204" charset="0"/>
-                <a:cs typeface="Lato" panose="020B0604020202020204" charset="0"/>
-              </a:rPr>
-              <a:t> usando o seu nome de rota;</a:t>
-            </a:r>
-          </a:p>
-          <a:p>
-            <a:pPr marL="457200" indent="-457200" algn="just">
-              <a:lnSpc>
-                <a:spcPts val="4759"/>
-              </a:lnSpc>
-              <a:buFont typeface="Arial" panose="020B0604020202020204" pitchFamily="34" charset="0"/>
-              <a:buChar char="•"/>
-            </a:pPr>
-            <a:endParaRPr lang="pt-BR" sz="3400" spc="339" dirty="0">
-              <a:solidFill>
-                <a:srgbClr val="000000"/>
-              </a:solidFill>
-              <a:latin typeface="Lato" panose="020B0604020202020204" charset="0"/>
-              <a:ea typeface="Lato" panose="020B0604020202020204" charset="0"/>
-              <a:cs typeface="Lato" panose="020B0604020202020204" charset="0"/>
-            </a:endParaRPr>
-          </a:p>
-          <a:p>
-            <a:pPr marL="457200" indent="-457200" algn="just">
-              <a:lnSpc>
-                <a:spcPts val="4759"/>
-              </a:lnSpc>
-              <a:buFont typeface="Arial" panose="020B0604020202020204" pitchFamily="34" charset="0"/>
-              <a:buChar char="•"/>
-            </a:pPr>
-            <a:r>
-              <a:rPr lang="pt-BR" sz="3400" spc="339" dirty="0" smtClean="0">
-                <a:solidFill>
-                  <a:srgbClr val="000000"/>
-                </a:solidFill>
-                <a:latin typeface="Lato" panose="020B0604020202020204" charset="0"/>
-                <a:ea typeface="Lato" panose="020B0604020202020204" charset="0"/>
-                <a:cs typeface="Lato" panose="020B0604020202020204" charset="0"/>
-              </a:rPr>
-              <a:t>É útil quando há muitas telas no aplicativo e a navegação se torna complexa;</a:t>
-            </a:r>
-          </a:p>
-          <a:p>
-            <a:pPr marL="457200" indent="-457200" algn="just">
-              <a:lnSpc>
-                <a:spcPts val="4759"/>
-              </a:lnSpc>
-              <a:buFont typeface="Arial" panose="020B0604020202020204" pitchFamily="34" charset="0"/>
-              <a:buChar char="•"/>
-            </a:pPr>
-            <a:endParaRPr lang="pt-BR" sz="3400" spc="339" dirty="0">
-              <a:solidFill>
-                <a:srgbClr val="000000"/>
-              </a:solidFill>
-              <a:latin typeface="Lato" panose="020B0604020202020204" charset="0"/>
-              <a:ea typeface="Lato" panose="020B0604020202020204" charset="0"/>
-              <a:cs typeface="Lato" panose="020B0604020202020204" charset="0"/>
-            </a:endParaRPr>
-          </a:p>
-          <a:p>
-            <a:pPr marL="457200" indent="-457200" algn="just">
-              <a:lnSpc>
-                <a:spcPts val="4759"/>
-              </a:lnSpc>
-              <a:buFont typeface="Arial" panose="020B0604020202020204" pitchFamily="34" charset="0"/>
-              <a:buChar char="•"/>
-            </a:pPr>
-            <a:r>
-              <a:rPr lang="pt-BR" sz="3400" spc="339" dirty="0" smtClean="0">
-                <a:solidFill>
-                  <a:srgbClr val="000000"/>
-                </a:solidFill>
-                <a:latin typeface="Lato" panose="020B0604020202020204" charset="0"/>
-                <a:ea typeface="Lato" panose="020B0604020202020204" charset="0"/>
-                <a:cs typeface="Lato" panose="020B0604020202020204" charset="0"/>
-              </a:rPr>
-              <a:t>A seguir será apresentado um exemplo do seu uso.</a:t>
-            </a:r>
-          </a:p>
         </p:txBody>
       </p:sp>
     </p:spTree>
     <p:extLst>
       <p:ext uri="{BB962C8B-B14F-4D97-AF65-F5344CB8AC3E}">
-        <p14:creationId xmlns:p14="http://schemas.microsoft.com/office/powerpoint/2010/main" val="2116126278"/>
+        <p14:creationId xmlns:p14="http://schemas.microsoft.com/office/powerpoint/2010/main" val="3143987033"/>
       </p:ext>
     </p:extLst>
   </p:cSld>
@@ -7658,6 +7944,95 @@
           <a:chExt cx="0" cy="0"/>
         </a:xfrm>
       </p:grpSpPr>
+      <p:sp>
+        <p:nvSpPr>
+          <p:cNvPr id="13" name="TextBox 13"/>
+          <p:cNvSpPr txBox="1"/>
+          <p:nvPr/>
+        </p:nvSpPr>
+        <p:spPr>
+          <a:xfrm>
+            <a:off x="4800600" y="571500"/>
+            <a:ext cx="8115300" cy="1615827"/>
+          </a:xfrm>
+          <a:prstGeom prst="rect">
+            <a:avLst/>
+          </a:prstGeom>
+        </p:spPr>
+        <p:txBody>
+          <a:bodyPr wrap="square" lIns="0" tIns="0" rIns="0" bIns="0" rtlCol="0" anchor="t">
+            <a:spAutoFit/>
+          </a:bodyPr>
+          <a:lstStyle/>
+          <a:p>
+            <a:pPr algn="ctr">
+              <a:lnSpc>
+                <a:spcPts val="6300"/>
+              </a:lnSpc>
+            </a:pPr>
+            <a:r>
+              <a:rPr lang="en-US" sz="5000" spc="300" dirty="0" smtClean="0">
+                <a:solidFill>
+                  <a:srgbClr val="2B4A9D"/>
+                </a:solidFill>
+                <a:latin typeface="Poppins Ultra-Bold"/>
+              </a:rPr>
+              <a:t>O </a:t>
+            </a:r>
+            <a:r>
+              <a:rPr lang="en-US" sz="5000" spc="300" dirty="0" err="1" smtClean="0">
+                <a:solidFill>
+                  <a:srgbClr val="2B4A9D"/>
+                </a:solidFill>
+                <a:latin typeface="Poppins Ultra-Bold"/>
+              </a:rPr>
+              <a:t>uso</a:t>
+            </a:r>
+            <a:r>
+              <a:rPr lang="en-US" sz="5000" spc="300" dirty="0" smtClean="0">
+                <a:solidFill>
+                  <a:srgbClr val="2B4A9D"/>
+                </a:solidFill>
+                <a:latin typeface="Poppins Ultra-Bold"/>
+              </a:rPr>
+              <a:t> de </a:t>
+            </a:r>
+            <a:r>
+              <a:rPr lang="en-US" sz="5000" spc="300" dirty="0" err="1" smtClean="0">
+                <a:solidFill>
+                  <a:srgbClr val="2B4A9D"/>
+                </a:solidFill>
+                <a:latin typeface="Poppins Ultra-Bold"/>
+              </a:rPr>
+              <a:t>Rotas</a:t>
+            </a:r>
+            <a:r>
+              <a:rPr lang="en-US" sz="5000" spc="300" dirty="0" smtClean="0">
+                <a:solidFill>
+                  <a:srgbClr val="2B4A9D"/>
+                </a:solidFill>
+                <a:latin typeface="Poppins Ultra-Bold"/>
+              </a:rPr>
+              <a:t> </a:t>
+            </a:r>
+            <a:r>
+              <a:rPr lang="en-US" sz="5000" spc="300" dirty="0" err="1" smtClean="0">
+                <a:solidFill>
+                  <a:srgbClr val="2B4A9D"/>
+                </a:solidFill>
+                <a:latin typeface="Poppins Ultra-Bold"/>
+              </a:rPr>
+              <a:t>Nomeadas</a:t>
+            </a:r>
+            <a:endParaRPr lang="en-US" sz="5000" spc="300" dirty="0">
+              <a:solidFill>
+                <a:srgbClr val="2B4A9D"/>
+              </a:solidFill>
+              <a:latin typeface="Poppins Ultra-Bold"/>
+            </a:endParaRPr>
+          </a:p>
+        </p:txBody>
+      </p:sp>
       <p:grpSp>
         <p:nvGrpSpPr>
           <p:cNvPr id="14" name="Group 14"/>
@@ -7721,8 +8096,8 @@
         </p:nvSpPr>
         <p:spPr>
           <a:xfrm>
-            <a:off x="304800" y="2135148"/>
-            <a:ext cx="8229600" cy="6771084"/>
+            <a:off x="990600" y="2933700"/>
+            <a:ext cx="16144008" cy="6155531"/>
           </a:xfrm>
           <a:prstGeom prst="rect">
             <a:avLst/>
@@ -7750,7 +8125,29 @@
                 <a:ea typeface="Lato" panose="020B0604020202020204" charset="0"/>
                 <a:cs typeface="Lato" panose="020B0604020202020204" charset="0"/>
               </a:rPr>
-              <a:t>Primeiramente, são definidas as rotas;</a:t>
+              <a:t>No roteamento nomeado, é definido uma tabela de rotas, com os nomes de rotas e seus respectivos </a:t>
+            </a:r>
+            <a:r>
+              <a:rPr lang="pt-BR" sz="3400" spc="339" dirty="0" err="1" smtClean="0">
+                <a:solidFill>
+                  <a:srgbClr val="000000"/>
+                </a:solidFill>
+                <a:latin typeface="Lato" panose="020B0604020202020204" charset="0"/>
+                <a:ea typeface="Lato" panose="020B0604020202020204" charset="0"/>
+                <a:cs typeface="Lato" panose="020B0604020202020204" charset="0"/>
+              </a:rPr>
+              <a:t>widgets</a:t>
+            </a:r>
+            <a:r>
+              <a:rPr lang="pt-BR" sz="3400" spc="339" dirty="0" smtClean="0">
+                <a:solidFill>
+                  <a:srgbClr val="000000"/>
+                </a:solidFill>
+                <a:latin typeface="Lato" panose="020B0604020202020204" charset="0"/>
+                <a:ea typeface="Lato" panose="020B0604020202020204" charset="0"/>
+                <a:cs typeface="Lato" panose="020B0604020202020204" charset="0"/>
+              </a:rPr>
+              <a:t>;</a:t>
             </a:r>
           </a:p>
           <a:p>
@@ -7787,7 +8184,7 @@
                 <a:ea typeface="Lato" panose="020B0604020202020204" charset="0"/>
                 <a:cs typeface="Lato" panose="020B0604020202020204" charset="0"/>
               </a:rPr>
-              <a:t>A propriedade “</a:t>
+              <a:t>Então, é possível navegar para um </a:t>
             </a:r>
             <a:r>
               <a:rPr lang="pt-BR" sz="3400" spc="339" dirty="0" err="1" smtClean="0">
@@ -7798,7 +8195,7 @@
                 <a:ea typeface="Lato" panose="020B0604020202020204" charset="0"/>
                 <a:cs typeface="Lato" panose="020B0604020202020204" charset="0"/>
               </a:rPr>
-              <a:t>initialRoute</a:t>
+              <a:t>widget</a:t>
             </a:r>
             <a:r>
               <a:rPr lang="pt-BR" sz="3400" spc="339" dirty="0" smtClean="0">
@@ -7809,7 +8206,7 @@
                 <a:ea typeface="Lato" panose="020B0604020202020204" charset="0"/>
                 <a:cs typeface="Lato" panose="020B0604020202020204" charset="0"/>
               </a:rPr>
-              <a:t>” define com qual rota o aplicativo deve começar;</a:t>
+              <a:t> usando o seu nome de rota;</a:t>
             </a:r>
           </a:p>
           <a:p>
@@ -7846,138 +8243,52 @@
                 <a:ea typeface="Lato" panose="020B0604020202020204" charset="0"/>
                 <a:cs typeface="Lato" panose="020B0604020202020204" charset="0"/>
               </a:rPr>
-              <a:t>A propriedade “</a:t>
-            </a:r>
-            <a:r>
-              <a:rPr lang="pt-BR" sz="3400" spc="339" dirty="0" err="1" smtClean="0">
-                <a:solidFill>
-                  <a:srgbClr val="000000"/>
-                </a:solidFill>
-                <a:latin typeface="Lato" panose="020B0604020202020204" charset="0"/>
-                <a:ea typeface="Lato" panose="020B0604020202020204" charset="0"/>
-                <a:cs typeface="Lato" panose="020B0604020202020204" charset="0"/>
-              </a:rPr>
-              <a:t>routes</a:t>
-            </a:r>
-            <a:r>
-              <a:rPr lang="pt-BR" sz="3400" spc="339" dirty="0" smtClean="0">
-                <a:solidFill>
-                  <a:srgbClr val="000000"/>
-                </a:solidFill>
-                <a:latin typeface="Lato" panose="020B0604020202020204" charset="0"/>
-                <a:ea typeface="Lato" panose="020B0604020202020204" charset="0"/>
-                <a:cs typeface="Lato" panose="020B0604020202020204" charset="0"/>
-              </a:rPr>
-              <a:t>” define as rotas nomeadas disponíveis e os </a:t>
-            </a:r>
-            <a:r>
-              <a:rPr lang="pt-BR" sz="3400" spc="339" dirty="0" err="1" smtClean="0">
-                <a:solidFill>
-                  <a:srgbClr val="000000"/>
-                </a:solidFill>
-                <a:latin typeface="Lato" panose="020B0604020202020204" charset="0"/>
-                <a:ea typeface="Lato" panose="020B0604020202020204" charset="0"/>
-                <a:cs typeface="Lato" panose="020B0604020202020204" charset="0"/>
-              </a:rPr>
-              <a:t>widgets</a:t>
-            </a:r>
-            <a:r>
-              <a:rPr lang="pt-BR" sz="3400" spc="339" dirty="0">
-                <a:solidFill>
-                  <a:srgbClr val="000000"/>
-                </a:solidFill>
-                <a:latin typeface="Lato" panose="020B0604020202020204" charset="0"/>
-                <a:ea typeface="Lato" panose="020B0604020202020204" charset="0"/>
-                <a:cs typeface="Lato" panose="020B0604020202020204" charset="0"/>
-              </a:rPr>
-              <a:t> </a:t>
-            </a:r>
-            <a:r>
-              <a:rPr lang="pt-BR" sz="3400" spc="339" dirty="0" smtClean="0">
-                <a:solidFill>
-                  <a:srgbClr val="000000"/>
-                </a:solidFill>
-                <a:latin typeface="Lato" panose="020B0604020202020204" charset="0"/>
-                <a:ea typeface="Lato" panose="020B0604020202020204" charset="0"/>
-                <a:cs typeface="Lato" panose="020B0604020202020204" charset="0"/>
-              </a:rPr>
-              <a:t>que serão construídos ao navegar para essas rotas.</a:t>
-            </a:r>
-          </a:p>
-        </p:txBody>
-      </p:sp>
-      <p:pic>
-        <p:nvPicPr>
-          <p:cNvPr id="3" name="Imagem 2"/>
-          <p:cNvPicPr>
-            <a:picLocks noChangeAspect="1"/>
-          </p:cNvPicPr>
-          <p:nvPr/>
-        </p:nvPicPr>
-        <p:blipFill>
-          <a:blip r:embed="rId2">
-            <a:extLst>
-              <a:ext uri="{28A0092B-C50C-407E-A947-70E740481C1C}">
-                <a14:useLocalDpi xmlns:a14="http://schemas.microsoft.com/office/drawing/2010/main" val="0"/>
-              </a:ext>
-            </a:extLst>
-          </a:blip>
-          <a:stretch>
-            <a:fillRect/>
-          </a:stretch>
-        </p:blipFill>
-        <p:spPr>
-          <a:xfrm>
-            <a:off x="8915400" y="3009900"/>
-            <a:ext cx="8890055" cy="5021580"/>
-          </a:xfrm>
-          <a:prstGeom prst="rect">
-            <a:avLst/>
-          </a:prstGeom>
-        </p:spPr>
-      </p:pic>
-      <p:sp>
-        <p:nvSpPr>
-          <p:cNvPr id="4" name="CaixaDeTexto 3"/>
-          <p:cNvSpPr txBox="1"/>
-          <p:nvPr/>
-        </p:nvSpPr>
-        <p:spPr>
-          <a:xfrm>
-            <a:off x="11173770" y="8191500"/>
-            <a:ext cx="4565673" cy="477054"/>
-          </a:xfrm>
-          <a:prstGeom prst="rect">
-            <a:avLst/>
-          </a:prstGeom>
-          <a:noFill/>
-        </p:spPr>
-        <p:txBody>
-          <a:bodyPr wrap="none" rtlCol="0">
-            <a:spAutoFit/>
-          </a:bodyPr>
-          <a:lstStyle/>
-          <a:p>
-            <a:r>
-              <a:rPr lang="pt-BR" sz="2500" dirty="0" smtClean="0">
-                <a:latin typeface="Lato" panose="020B0604020202020204" charset="0"/>
-                <a:ea typeface="Lato" panose="020B0604020202020204" charset="0"/>
-                <a:cs typeface="Lato" panose="020B0604020202020204" charset="0"/>
-              </a:rPr>
-              <a:t>Figura 03 – Definição das rotas</a:t>
-            </a:r>
-            <a:endParaRPr lang="pt-BR" sz="2500" dirty="0">
+              <a:t>É útil quando há muitas telas no aplicativo e a navegação se torna complexa;</a:t>
+            </a:r>
+          </a:p>
+          <a:p>
+            <a:pPr marL="457200" indent="-457200" algn="just">
+              <a:lnSpc>
+                <a:spcPts val="4759"/>
+              </a:lnSpc>
+              <a:buFont typeface="Arial" panose="020B0604020202020204" pitchFamily="34" charset="0"/>
+              <a:buChar char="•"/>
+            </a:pPr>
+            <a:endParaRPr lang="pt-BR" sz="3400" spc="339" dirty="0">
+              <a:solidFill>
+                <a:srgbClr val="000000"/>
+              </a:solidFill>
               <a:latin typeface="Lato" panose="020B0604020202020204" charset="0"/>
               <a:ea typeface="Lato" panose="020B0604020202020204" charset="0"/>
               <a:cs typeface="Lato" panose="020B0604020202020204" charset="0"/>
             </a:endParaRPr>
           </a:p>
+          <a:p>
+            <a:pPr marL="457200" indent="-457200" algn="just">
+              <a:lnSpc>
+                <a:spcPts val="4759"/>
+              </a:lnSpc>
+              <a:buFont typeface="Arial" panose="020B0604020202020204" pitchFamily="34" charset="0"/>
+              <a:buChar char="•"/>
+            </a:pPr>
+            <a:r>
+              <a:rPr lang="pt-BR" sz="3400" spc="339" dirty="0" smtClean="0">
+                <a:solidFill>
+                  <a:srgbClr val="000000"/>
+                </a:solidFill>
+                <a:latin typeface="Lato" panose="020B0604020202020204" charset="0"/>
+                <a:ea typeface="Lato" panose="020B0604020202020204" charset="0"/>
+                <a:cs typeface="Lato" panose="020B0604020202020204" charset="0"/>
+              </a:rPr>
+              <a:t>A seguir será apresentado um exemplo do seu uso.</a:t>
+            </a:r>
+          </a:p>
         </p:txBody>
       </p:sp>
     </p:spTree>
     <p:extLst>
       <p:ext uri="{BB962C8B-B14F-4D97-AF65-F5344CB8AC3E}">
-        <p14:creationId xmlns:p14="http://schemas.microsoft.com/office/powerpoint/2010/main" val="3299757794"/>
+        <p14:creationId xmlns:p14="http://schemas.microsoft.com/office/powerpoint/2010/main" val="2116126278"/>
       </p:ext>
     </p:extLst>
   </p:cSld>
@@ -8074,8 +8385,8 @@
         </p:nvSpPr>
         <p:spPr>
           <a:xfrm>
-            <a:off x="228600" y="2081014"/>
-            <a:ext cx="7945120" cy="6155531"/>
+            <a:off x="304800" y="2135148"/>
+            <a:ext cx="8229600" cy="6771084"/>
           </a:xfrm>
           <a:prstGeom prst="rect">
             <a:avLst/>
@@ -8103,7 +8414,7 @@
                 <a:ea typeface="Lato" panose="020B0604020202020204" charset="0"/>
                 <a:cs typeface="Lato" panose="020B0604020202020204" charset="0"/>
               </a:rPr>
-              <a:t>Serão criadas duas telas;</a:t>
+              <a:t>Primeiramente, são definidas as rotas;</a:t>
             </a:r>
           </a:p>
           <a:p>
@@ -8140,7 +8451,29 @@
                 <a:ea typeface="Lato" panose="020B0604020202020204" charset="0"/>
                 <a:cs typeface="Lato" panose="020B0604020202020204" charset="0"/>
               </a:rPr>
-              <a:t>A primeira tela contém um botão que navega para a segunda tela;</a:t>
+              <a:t>A propriedade “</a:t>
+            </a:r>
+            <a:r>
+              <a:rPr lang="pt-BR" sz="3400" spc="339" dirty="0" err="1" smtClean="0">
+                <a:solidFill>
+                  <a:srgbClr val="000000"/>
+                </a:solidFill>
+                <a:latin typeface="Lato" panose="020B0604020202020204" charset="0"/>
+                <a:ea typeface="Lato" panose="020B0604020202020204" charset="0"/>
+                <a:cs typeface="Lato" panose="020B0604020202020204" charset="0"/>
+              </a:rPr>
+              <a:t>initialRoute</a:t>
+            </a:r>
+            <a:r>
+              <a:rPr lang="pt-BR" sz="3400" spc="339" dirty="0" smtClean="0">
+                <a:solidFill>
+                  <a:srgbClr val="000000"/>
+                </a:solidFill>
+                <a:latin typeface="Lato" panose="020B0604020202020204" charset="0"/>
+                <a:ea typeface="Lato" panose="020B0604020202020204" charset="0"/>
+                <a:cs typeface="Lato" panose="020B0604020202020204" charset="0"/>
+              </a:rPr>
+              <a:t>” define com qual rota o aplicativo deve começar;</a:t>
             </a:r>
           </a:p>
           <a:p>
@@ -8161,7 +8494,7 @@
             </a:endParaRPr>
           </a:p>
           <a:p>
-            <a:pPr marL="457200" indent="-457200">
+            <a:pPr marL="457200" indent="-457200" algn="just">
               <a:lnSpc>
                 <a:spcPts val="4759"/>
               </a:lnSpc>
@@ -8177,7 +8510,7 @@
                 <a:ea typeface="Lato" panose="020B0604020202020204" charset="0"/>
                 <a:cs typeface="Lato" panose="020B0604020202020204" charset="0"/>
               </a:rPr>
-              <a:t>A função “</a:t>
+              <a:t>A propriedade “</a:t>
             </a:r>
             <a:r>
               <a:rPr lang="pt-BR" sz="3400" spc="339" dirty="0" err="1" smtClean="0">
@@ -8188,7 +8521,7 @@
                 <a:ea typeface="Lato" panose="020B0604020202020204" charset="0"/>
                 <a:cs typeface="Lato" panose="020B0604020202020204" charset="0"/>
               </a:rPr>
-              <a:t>Navigator.pushNamed</a:t>
+              <a:t>routes</a:t>
             </a:r>
             <a:r>
               <a:rPr lang="pt-BR" sz="3400" spc="339" dirty="0" smtClean="0">
@@ -8199,52 +8532,47 @@
                 <a:ea typeface="Lato" panose="020B0604020202020204" charset="0"/>
                 <a:cs typeface="Lato" panose="020B0604020202020204" charset="0"/>
               </a:rPr>
-              <a:t>” aciona a navegação, indicando qual será o caminho.</a:t>
-            </a:r>
-          </a:p>
-        </p:txBody>
-      </p:sp>
-      <p:sp>
-        <p:nvSpPr>
-          <p:cNvPr id="4" name="CaixaDeTexto 3"/>
-          <p:cNvSpPr txBox="1"/>
-          <p:nvPr/>
-        </p:nvSpPr>
-        <p:spPr>
-          <a:xfrm>
-            <a:off x="11322551" y="7998018"/>
-            <a:ext cx="3708066" cy="477054"/>
-          </a:xfrm>
-          <a:prstGeom prst="rect">
-            <a:avLst/>
-          </a:prstGeom>
-          <a:noFill/>
-        </p:spPr>
-        <p:txBody>
-          <a:bodyPr wrap="none" rtlCol="0">
-            <a:spAutoFit/>
-          </a:bodyPr>
-          <a:lstStyle/>
-          <a:p>
-            <a:r>
-              <a:rPr lang="pt-BR" sz="2500" dirty="0" smtClean="0">
-                <a:latin typeface="Lato" panose="020B0604020202020204" charset="0"/>
-                <a:ea typeface="Lato" panose="020B0604020202020204" charset="0"/>
-                <a:cs typeface="Lato" panose="020B0604020202020204" charset="0"/>
-              </a:rPr>
-              <a:t>Figura 04 – Primeira Tela</a:t>
-            </a:r>
-            <a:endParaRPr lang="pt-BR" sz="2500" dirty="0">
-              <a:latin typeface="Lato" panose="020B0604020202020204" charset="0"/>
-              <a:ea typeface="Lato" panose="020B0604020202020204" charset="0"/>
-              <a:cs typeface="Lato" panose="020B0604020202020204" charset="0"/>
-            </a:endParaRPr>
+              <a:t>” define as rotas nomeadas disponíveis e os </a:t>
+            </a:r>
+            <a:r>
+              <a:rPr lang="pt-BR" sz="3400" spc="339" dirty="0" err="1" smtClean="0">
+                <a:solidFill>
+                  <a:srgbClr val="000000"/>
+                </a:solidFill>
+                <a:latin typeface="Lato" panose="020B0604020202020204" charset="0"/>
+                <a:ea typeface="Lato" panose="020B0604020202020204" charset="0"/>
+                <a:cs typeface="Lato" panose="020B0604020202020204" charset="0"/>
+              </a:rPr>
+              <a:t>widgets</a:t>
+            </a:r>
+            <a:r>
+              <a:rPr lang="pt-BR" sz="3400" spc="339" dirty="0">
+                <a:solidFill>
+                  <a:srgbClr val="000000"/>
+                </a:solidFill>
+                <a:latin typeface="Lato" panose="020B0604020202020204" charset="0"/>
+                <a:ea typeface="Lato" panose="020B0604020202020204" charset="0"/>
+                <a:cs typeface="Lato" panose="020B0604020202020204" charset="0"/>
+              </a:rPr>
+              <a:t> </a:t>
+            </a:r>
+            <a:r>
+              <a:rPr lang="pt-BR" sz="3400" spc="339" dirty="0" smtClean="0">
+                <a:solidFill>
+                  <a:srgbClr val="000000"/>
+                </a:solidFill>
+                <a:latin typeface="Lato" panose="020B0604020202020204" charset="0"/>
+                <a:ea typeface="Lato" panose="020B0604020202020204" charset="0"/>
+                <a:cs typeface="Lato" panose="020B0604020202020204" charset="0"/>
+              </a:rPr>
+              <a:t>que serão construídos ao navegar para essas rotas.</a:t>
+            </a:r>
           </a:p>
         </p:txBody>
       </p:sp>
       <p:pic>
         <p:nvPicPr>
-          <p:cNvPr id="2" name="Imagem 1"/>
+          <p:cNvPr id="3" name="Imagem 2"/>
           <p:cNvPicPr>
             <a:picLocks noChangeAspect="1"/>
           </p:cNvPicPr>
@@ -8264,18 +8592,56 @@
         </p:blipFill>
         <p:spPr>
           <a:xfrm>
-            <a:off x="8382000" y="2628900"/>
-            <a:ext cx="9589169" cy="5059760"/>
+            <a:off x="8915400" y="3009900"/>
+            <a:ext cx="8890055" cy="5021580"/>
           </a:xfrm>
           <a:prstGeom prst="rect">
             <a:avLst/>
           </a:prstGeom>
         </p:spPr>
       </p:pic>
+      <p:sp>
+        <p:nvSpPr>
+          <p:cNvPr id="4" name="CaixaDeTexto 3"/>
+          <p:cNvSpPr txBox="1"/>
+          <p:nvPr/>
+        </p:nvSpPr>
+        <p:spPr>
+          <a:xfrm>
+            <a:off x="11173770" y="8191500"/>
+            <a:ext cx="4565673" cy="477054"/>
+          </a:xfrm>
+          <a:prstGeom prst="rect">
+            <a:avLst/>
+          </a:prstGeom>
+          <a:noFill/>
+        </p:spPr>
+        <p:txBody>
+          <a:bodyPr wrap="none" rtlCol="0">
+            <a:spAutoFit/>
+          </a:bodyPr>
+          <a:lstStyle/>
+          <a:p>
+            <a:r>
+              <a:rPr lang="pt-BR" sz="2500" dirty="0" smtClean="0">
+                <a:latin typeface="Lato" panose="020B0604020202020204" charset="0"/>
+                <a:ea typeface="Lato" panose="020B0604020202020204" charset="0"/>
+                <a:cs typeface="Lato" panose="020B0604020202020204" charset="0"/>
+              </a:rPr>
+              <a:t>Figura 03 – Definição das rotas</a:t>
+            </a:r>
+            <a:endParaRPr lang="pt-BR" sz="2500" dirty="0">
+              <a:latin typeface="Lato" panose="020B0604020202020204" charset="0"/>
+              <a:ea typeface="Lato" panose="020B0604020202020204" charset="0"/>
+              <a:cs typeface="Lato" panose="020B0604020202020204" charset="0"/>
+            </a:endParaRPr>
+          </a:p>
+        </p:txBody>
+      </p:sp>
     </p:spTree>
     <p:extLst>
       <p:ext uri="{BB962C8B-B14F-4D97-AF65-F5344CB8AC3E}">
-        <p14:creationId xmlns:p14="http://schemas.microsoft.com/office/powerpoint/2010/main" val="2677243512"/>
+        <p14:creationId xmlns:p14="http://schemas.microsoft.com/office/powerpoint/2010/main" val="3299757794"/>
       </p:ext>
     </p:extLst>
   </p:cSld>

</xml_diff>

<commit_message>
Correção da aula sobre Navegação entre telas
</commit_message>
<xml_diff>
--- a/Aula05-Navegação entre Telas/Aula05-Navegação entre Telas.pptx
+++ b/Aula05-Navegação entre Telas/Aula05-Navegação entre Telas.pptx
@@ -23,7 +23,7 @@
   <p:notesSz cx="6858000" cy="9144000"/>
   <p:embeddedFontLst>
     <p:embeddedFont>
-      <p:font typeface="Poppins Ultra-Bold" panose="020B0604020202020204" charset="0"/>
+      <p:font typeface="Poppins Bold" panose="020B0604020202020204" charset="0"/>
       <p:regular r:id="rId15"/>
     </p:embeddedFont>
     <p:embeddedFont>
@@ -31,7 +31,7 @@
       <p:regular r:id="rId16"/>
     </p:embeddedFont>
     <p:embeddedFont>
-      <p:font typeface="Poppins Bold" panose="020B0604020202020204" charset="0"/>
+      <p:font typeface="Poppins Ultra-Bold" panose="020B0604020202020204" charset="0"/>
       <p:regular r:id="rId17"/>
     </p:embeddedFont>
     <p:embeddedFont>
@@ -340,7 +340,7 @@
             <a:fld id="{1D8BD707-D9CF-40AE-B4C6-C98DA3205C09}" type="datetimeFigureOut">
               <a:rPr lang="en-US" smtClean="0"/>
               <a:pPr/>
-              <a:t>3/8/2024</a:t>
+              <a:t>3/16/2024</a:t>
             </a:fld>
             <a:endParaRPr lang="en-US"/>
           </a:p>
@@ -505,7 +505,7 @@
             <a:fld id="{1D8BD707-D9CF-40AE-B4C6-C98DA3205C09}" type="datetimeFigureOut">
               <a:rPr lang="en-US" smtClean="0"/>
               <a:pPr/>
-              <a:t>3/8/2024</a:t>
+              <a:t>3/16/2024</a:t>
             </a:fld>
             <a:endParaRPr lang="en-US"/>
           </a:p>
@@ -680,7 +680,7 @@
             <a:fld id="{1D8BD707-D9CF-40AE-B4C6-C98DA3205C09}" type="datetimeFigureOut">
               <a:rPr lang="en-US" smtClean="0"/>
               <a:pPr/>
-              <a:t>3/8/2024</a:t>
+              <a:t>3/16/2024</a:t>
             </a:fld>
             <a:endParaRPr lang="en-US"/>
           </a:p>
@@ -845,7 +845,7 @@
             <a:fld id="{1D8BD707-D9CF-40AE-B4C6-C98DA3205C09}" type="datetimeFigureOut">
               <a:rPr lang="en-US" smtClean="0"/>
               <a:pPr/>
-              <a:t>3/8/2024</a:t>
+              <a:t>3/16/2024</a:t>
             </a:fld>
             <a:endParaRPr lang="en-US"/>
           </a:p>
@@ -1087,7 +1087,7 @@
             <a:fld id="{1D8BD707-D9CF-40AE-B4C6-C98DA3205C09}" type="datetimeFigureOut">
               <a:rPr lang="en-US" smtClean="0"/>
               <a:pPr/>
-              <a:t>3/8/2024</a:t>
+              <a:t>3/16/2024</a:t>
             </a:fld>
             <a:endParaRPr lang="en-US"/>
           </a:p>
@@ -1369,7 +1369,7 @@
             <a:fld id="{1D8BD707-D9CF-40AE-B4C6-C98DA3205C09}" type="datetimeFigureOut">
               <a:rPr lang="en-US" smtClean="0"/>
               <a:pPr/>
-              <a:t>3/8/2024</a:t>
+              <a:t>3/16/2024</a:t>
             </a:fld>
             <a:endParaRPr lang="en-US"/>
           </a:p>
@@ -1785,7 +1785,7 @@
             <a:fld id="{1D8BD707-D9CF-40AE-B4C6-C98DA3205C09}" type="datetimeFigureOut">
               <a:rPr lang="en-US" smtClean="0"/>
               <a:pPr/>
-              <a:t>3/8/2024</a:t>
+              <a:t>3/16/2024</a:t>
             </a:fld>
             <a:endParaRPr lang="en-US"/>
           </a:p>
@@ -1899,7 +1899,7 @@
             <a:fld id="{1D8BD707-D9CF-40AE-B4C6-C98DA3205C09}" type="datetimeFigureOut">
               <a:rPr lang="en-US" smtClean="0"/>
               <a:pPr/>
-              <a:t>3/8/2024</a:t>
+              <a:t>3/16/2024</a:t>
             </a:fld>
             <a:endParaRPr lang="en-US"/>
           </a:p>
@@ -1991,7 +1991,7 @@
             <a:fld id="{1D8BD707-D9CF-40AE-B4C6-C98DA3205C09}" type="datetimeFigureOut">
               <a:rPr lang="en-US" smtClean="0"/>
               <a:pPr/>
-              <a:t>3/8/2024</a:t>
+              <a:t>3/16/2024</a:t>
             </a:fld>
             <a:endParaRPr lang="en-US"/>
           </a:p>
@@ -2263,7 +2263,7 @@
             <a:fld id="{1D8BD707-D9CF-40AE-B4C6-C98DA3205C09}" type="datetimeFigureOut">
               <a:rPr lang="en-US" smtClean="0"/>
               <a:pPr/>
-              <a:t>3/8/2024</a:t>
+              <a:t>3/16/2024</a:t>
             </a:fld>
             <a:endParaRPr lang="en-US"/>
           </a:p>
@@ -2512,7 +2512,7 @@
             <a:fld id="{1D8BD707-D9CF-40AE-B4C6-C98DA3205C09}" type="datetimeFigureOut">
               <a:rPr lang="en-US" smtClean="0"/>
               <a:pPr/>
-              <a:t>3/8/2024</a:t>
+              <a:t>3/16/2024</a:t>
             </a:fld>
             <a:endParaRPr lang="en-US"/>
           </a:p>
@@ -2720,7 +2720,7 @@
             <a:fld id="{1D8BD707-D9CF-40AE-B4C6-C98DA3205C09}" type="datetimeFigureOut">
               <a:rPr lang="en-US" smtClean="0"/>
               <a:pPr/>
-              <a:t>3/8/2024</a:t>
+              <a:t>3/16/2024</a:t>
             </a:fld>
             <a:endParaRPr lang="en-US"/>
           </a:p>
@@ -3524,7 +3524,7 @@
               <a:alphaModFix amt="69000"/>
               <a:extLst>
                 <a:ext uri="{96DAC541-7B7A-43D3-8B79-37D633B846F1}">
-                  <asvg:svgBlip xmlns:asvg="http://schemas.microsoft.com/office/drawing/2016/SVG/main" xmlns="" r:embed="rId3"/>
+                  <asvg:svgBlip xmlns="" xmlns:asvg="http://schemas.microsoft.com/office/drawing/2016/SVG/main" r:embed="rId3"/>
                 </a:ext>
               </a:extLst>
             </a:blip>
@@ -4252,7 +4252,7 @@
         <p:spPr>
           <a:xfrm>
             <a:off x="816673" y="2247900"/>
-            <a:ext cx="16611599" cy="1708160"/>
+            <a:ext cx="16611599" cy="1169551"/>
           </a:xfrm>
           <a:prstGeom prst="rect">
             <a:avLst/>
@@ -4272,52 +4272,25 @@
                 <a:ea typeface="Lato" panose="020B0604020202020204" charset="0"/>
                 <a:cs typeface="Lato" panose="020B0604020202020204" charset="0"/>
               </a:rPr>
-              <a:t>O exemplo com o código-fonte utilizando rotas nomeadas está no </a:t>
-            </a:r>
-            <a:r>
-              <a:rPr lang="pt-BR" sz="3500" dirty="0">
-                <a:latin typeface="Lato" panose="020B0604020202020204" charset="0"/>
-                <a:ea typeface="Lato" panose="020B0604020202020204" charset="0"/>
-                <a:cs typeface="Lato" panose="020B0604020202020204" charset="0"/>
-              </a:rPr>
-              <a:t>seguinte link: </a:t>
+              <a:t>O exemplo com o código-fonte utilizando rotas nomeadas </a:t>
             </a:r>
             <a:r>
               <a:rPr lang="pt-BR" sz="3500" dirty="0" smtClean="0">
                 <a:latin typeface="Lato" panose="020B0604020202020204" charset="0"/>
                 <a:ea typeface="Lato" panose="020B0604020202020204" charset="0"/>
                 <a:cs typeface="Lato" panose="020B0604020202020204" charset="0"/>
-                <a:hlinkClick r:id="rId2"/>
-              </a:rPr>
-              <a:t>https</a:t>
-            </a:r>
-            <a:r>
-              <a:rPr lang="pt-BR" sz="3500" dirty="0">
-                <a:latin typeface="Lato" panose="020B0604020202020204" charset="0"/>
-                <a:ea typeface="Lato" panose="020B0604020202020204" charset="0"/>
-                <a:cs typeface="Lato" panose="020B0604020202020204" charset="0"/>
-                <a:hlinkClick r:id="rId2"/>
-              </a:rPr>
-              <a:t>://</a:t>
-            </a:r>
-            <a:r>
-              <a:rPr lang="pt-BR" sz="3500" dirty="0" smtClean="0">
-                <a:latin typeface="Lato" panose="020B0604020202020204" charset="0"/>
-                <a:ea typeface="Lato" panose="020B0604020202020204" charset="0"/>
-                <a:cs typeface="Lato" panose="020B0604020202020204" charset="0"/>
-                <a:hlinkClick r:id="rId2"/>
-              </a:rPr>
-              <a:t>github.com/marcosdosea/TreinamentoFlutter/blob/main/Aula05-Navega%C3%A7%C3%A3o%20entre%20Telas/rotasNomeadas.dart</a:t>
-            </a:r>
-            <a:r>
-              <a:rPr lang="pt-BR" sz="3500" dirty="0" smtClean="0">
-                <a:latin typeface="Lato" panose="020B0604020202020204" charset="0"/>
-                <a:ea typeface="Lato" panose="020B0604020202020204" charset="0"/>
-                <a:cs typeface="Lato" panose="020B0604020202020204" charset="0"/>
-              </a:rPr>
-              <a:t>.</a:t>
-            </a:r>
-            <a:endParaRPr lang="pt-BR" sz="3500" dirty="0">
+              </a:rPr>
+              <a:t>encontra-se no arquivo </a:t>
+            </a:r>
+            <a:r>
+              <a:rPr lang="pt-BR" sz="3500" b="1" dirty="0" err="1" smtClean="0">
+                <a:latin typeface="Lato" panose="020B0604020202020204" charset="0"/>
+                <a:ea typeface="Lato" panose="020B0604020202020204" charset="0"/>
+                <a:cs typeface="Lato" panose="020B0604020202020204" charset="0"/>
+              </a:rPr>
+              <a:t>rotasNomeadas.dart</a:t>
+            </a:r>
+            <a:endParaRPr lang="pt-BR" sz="3500" b="1" dirty="0">
               <a:latin typeface="Lato" panose="020B0604020202020204" charset="0"/>
               <a:ea typeface="Lato" panose="020B0604020202020204" charset="0"/>
               <a:cs typeface="Lato" panose="020B0604020202020204" charset="0"/>
@@ -7818,7 +7791,7 @@
         <p:spPr>
           <a:xfrm>
             <a:off x="1143000" y="2247900"/>
-            <a:ext cx="16611599" cy="1708160"/>
+            <a:ext cx="16611599" cy="1169551"/>
           </a:xfrm>
           <a:prstGeom prst="rect">
             <a:avLst/>
@@ -7854,52 +7827,25 @@
                 <a:ea typeface="Lato" panose="020B0604020202020204" charset="0"/>
                 <a:cs typeface="Lato" panose="020B0604020202020204" charset="0"/>
               </a:rPr>
-              <a:t> básico está no </a:t>
-            </a:r>
-            <a:r>
-              <a:rPr lang="pt-BR" sz="3500" dirty="0">
-                <a:latin typeface="Lato" panose="020B0604020202020204" charset="0"/>
-                <a:ea typeface="Lato" panose="020B0604020202020204" charset="0"/>
-                <a:cs typeface="Lato" panose="020B0604020202020204" charset="0"/>
-              </a:rPr>
-              <a:t>seguinte link: </a:t>
+              <a:t> básico </a:t>
             </a:r>
             <a:r>
               <a:rPr lang="pt-BR" sz="3500" dirty="0" smtClean="0">
                 <a:latin typeface="Lato" panose="020B0604020202020204" charset="0"/>
                 <a:ea typeface="Lato" panose="020B0604020202020204" charset="0"/>
                 <a:cs typeface="Lato" panose="020B0604020202020204" charset="0"/>
-                <a:hlinkClick r:id="rId2"/>
-              </a:rPr>
-              <a:t>https</a:t>
-            </a:r>
-            <a:r>
-              <a:rPr lang="pt-BR" sz="3500" dirty="0">
-                <a:latin typeface="Lato" panose="020B0604020202020204" charset="0"/>
-                <a:ea typeface="Lato" panose="020B0604020202020204" charset="0"/>
-                <a:cs typeface="Lato" panose="020B0604020202020204" charset="0"/>
-                <a:hlinkClick r:id="rId2"/>
-              </a:rPr>
-              <a:t>://</a:t>
-            </a:r>
-            <a:r>
-              <a:rPr lang="pt-BR" sz="3500" dirty="0" smtClean="0">
-                <a:latin typeface="Lato" panose="020B0604020202020204" charset="0"/>
-                <a:ea typeface="Lato" panose="020B0604020202020204" charset="0"/>
-                <a:cs typeface="Lato" panose="020B0604020202020204" charset="0"/>
-                <a:hlinkClick r:id="rId2"/>
-              </a:rPr>
-              <a:t>github.com/marcosdosea/TreinamentoFlutter/blob/main/Aula05-Navega%C3%A7%C3%A3o%20entre%20Telas/navigatorBasico.dart</a:t>
-            </a:r>
-            <a:r>
-              <a:rPr lang="pt-BR" sz="3500" dirty="0" smtClean="0">
-                <a:latin typeface="Lato" panose="020B0604020202020204" charset="0"/>
-                <a:ea typeface="Lato" panose="020B0604020202020204" charset="0"/>
-                <a:cs typeface="Lato" panose="020B0604020202020204" charset="0"/>
-              </a:rPr>
-              <a:t>.</a:t>
-            </a:r>
-            <a:endParaRPr lang="pt-BR" sz="3500" dirty="0">
+              </a:rPr>
+              <a:t>encontra-se no arquivo </a:t>
+            </a:r>
+            <a:r>
+              <a:rPr lang="pt-BR" sz="3500" b="1" dirty="0" err="1" smtClean="0">
+                <a:latin typeface="Lato" panose="020B0604020202020204" charset="0"/>
+                <a:ea typeface="Lato" panose="020B0604020202020204" charset="0"/>
+                <a:cs typeface="Lato" panose="020B0604020202020204" charset="0"/>
+              </a:rPr>
+              <a:t>navigatorBasico.dart</a:t>
+            </a:r>
+            <a:endParaRPr lang="pt-BR" sz="3500" b="1" dirty="0">
               <a:latin typeface="Lato" panose="020B0604020202020204" charset="0"/>
               <a:ea typeface="Lato" panose="020B0604020202020204" charset="0"/>
               <a:cs typeface="Lato" panose="020B0604020202020204" charset="0"/>

</xml_diff>